<commit_message>
still working on act4
</commit_message>
<xml_diff>
--- a/src/activity2/Game_theory  .pptx
+++ b/src/activity2/Game_theory  .pptx
@@ -108,6 +108,11 @@
       </a:defRPr>
     </a:lvl9pPr>
   </p:defaultTextStyle>
+  <p:extLst>
+    <p:ext uri="{EFAFB233-063F-42B5-8137-9DF3F51BA10A}">
+      <p15:sldGuideLst xmlns:p15="http://schemas.microsoft.com/office/powerpoint/2012/main"/>
+    </p:ext>
+  </p:extLst>
 </p:presentation>
 </file>
 
@@ -260,7 +265,7 @@
           <a:p>
             <a:fld id="{85336C14-EB2D-4778-A48B-97E47E2FD4B0}" type="datetimeFigureOut">
               <a:rPr lang="en-GB" smtClean="0"/>
-              <a:t>19/06/2025</a:t>
+              <a:t>27/06/2025</a:t>
             </a:fld>
             <a:endParaRPr lang="en-GB"/>
           </a:p>
@@ -460,7 +465,7 @@
           <a:p>
             <a:fld id="{85336C14-EB2D-4778-A48B-97E47E2FD4B0}" type="datetimeFigureOut">
               <a:rPr lang="en-GB" smtClean="0"/>
-              <a:t>19/06/2025</a:t>
+              <a:t>27/06/2025</a:t>
             </a:fld>
             <a:endParaRPr lang="en-GB"/>
           </a:p>
@@ -670,7 +675,7 @@
           <a:p>
             <a:fld id="{85336C14-EB2D-4778-A48B-97E47E2FD4B0}" type="datetimeFigureOut">
               <a:rPr lang="en-GB" smtClean="0"/>
-              <a:t>19/06/2025</a:t>
+              <a:t>27/06/2025</a:t>
             </a:fld>
             <a:endParaRPr lang="en-GB"/>
           </a:p>
@@ -870,7 +875,7 @@
           <a:p>
             <a:fld id="{85336C14-EB2D-4778-A48B-97E47E2FD4B0}" type="datetimeFigureOut">
               <a:rPr lang="en-GB" smtClean="0"/>
-              <a:t>19/06/2025</a:t>
+              <a:t>27/06/2025</a:t>
             </a:fld>
             <a:endParaRPr lang="en-GB"/>
           </a:p>
@@ -1146,7 +1151,7 @@
           <a:p>
             <a:fld id="{85336C14-EB2D-4778-A48B-97E47E2FD4B0}" type="datetimeFigureOut">
               <a:rPr lang="en-GB" smtClean="0"/>
-              <a:t>19/06/2025</a:t>
+              <a:t>27/06/2025</a:t>
             </a:fld>
             <a:endParaRPr lang="en-GB"/>
           </a:p>
@@ -1414,7 +1419,7 @@
           <a:p>
             <a:fld id="{85336C14-EB2D-4778-A48B-97E47E2FD4B0}" type="datetimeFigureOut">
               <a:rPr lang="en-GB" smtClean="0"/>
-              <a:t>19/06/2025</a:t>
+              <a:t>27/06/2025</a:t>
             </a:fld>
             <a:endParaRPr lang="en-GB"/>
           </a:p>
@@ -1829,7 +1834,7 @@
           <a:p>
             <a:fld id="{85336C14-EB2D-4778-A48B-97E47E2FD4B0}" type="datetimeFigureOut">
               <a:rPr lang="en-GB" smtClean="0"/>
-              <a:t>19/06/2025</a:t>
+              <a:t>27/06/2025</a:t>
             </a:fld>
             <a:endParaRPr lang="en-GB"/>
           </a:p>
@@ -1971,7 +1976,7 @@
           <a:p>
             <a:fld id="{85336C14-EB2D-4778-A48B-97E47E2FD4B0}" type="datetimeFigureOut">
               <a:rPr lang="en-GB" smtClean="0"/>
-              <a:t>19/06/2025</a:t>
+              <a:t>27/06/2025</a:t>
             </a:fld>
             <a:endParaRPr lang="en-GB"/>
           </a:p>
@@ -2084,7 +2089,7 @@
           <a:p>
             <a:fld id="{85336C14-EB2D-4778-A48B-97E47E2FD4B0}" type="datetimeFigureOut">
               <a:rPr lang="en-GB" smtClean="0"/>
-              <a:t>19/06/2025</a:t>
+              <a:t>27/06/2025</a:t>
             </a:fld>
             <a:endParaRPr lang="en-GB"/>
           </a:p>
@@ -2397,7 +2402,7 @@
           <a:p>
             <a:fld id="{85336C14-EB2D-4778-A48B-97E47E2FD4B0}" type="datetimeFigureOut">
               <a:rPr lang="en-GB" smtClean="0"/>
-              <a:t>19/06/2025</a:t>
+              <a:t>27/06/2025</a:t>
             </a:fld>
             <a:endParaRPr lang="en-GB"/>
           </a:p>
@@ -2686,7 +2691,7 @@
           <a:p>
             <a:fld id="{85336C14-EB2D-4778-A48B-97E47E2FD4B0}" type="datetimeFigureOut">
               <a:rPr lang="en-GB" smtClean="0"/>
-              <a:t>19/06/2025</a:t>
+              <a:t>27/06/2025</a:t>
             </a:fld>
             <a:endParaRPr lang="en-GB"/>
           </a:p>
@@ -2929,7 +2934,7 @@
           <a:p>
             <a:fld id="{85336C14-EB2D-4778-A48B-97E47E2FD4B0}" type="datetimeFigureOut">
               <a:rPr lang="en-GB" smtClean="0"/>
-              <a:t>19/06/2025</a:t>
+              <a:t>27/06/2025</a:t>
             </a:fld>
             <a:endParaRPr lang="en-GB"/>
           </a:p>
@@ -3377,6 +3382,9 @@
             <a:pPr algn="l"/>
             <a:r>
               <a:rPr lang="en-GB" sz="2800" b="1" dirty="0">
+                <a:solidFill>
+                  <a:schemeClr val="accent2"/>
+                </a:solidFill>
                 <a:latin typeface="Segoe UI Bold" panose="020B0802040204020203" pitchFamily="34" charset="0"/>
                 <a:ea typeface="Calibri Bold" panose="020F0702030404030204" pitchFamily="34" charset="0"/>
                 <a:cs typeface="Segoe UI Bold" panose="020B0802040204020203" pitchFamily="34" charset="0"/>
@@ -3404,7 +3412,7 @@
         </p:nvSpPr>
         <p:spPr>
           <a:xfrm>
-            <a:off x="51459" y="540327"/>
+            <a:off x="51459" y="420769"/>
             <a:ext cx="7279574" cy="420770"/>
           </a:xfrm>
         </p:spPr>
@@ -3417,6 +3425,11 @@
             <a:pPr algn="l"/>
             <a:r>
               <a:rPr lang="en-GB" sz="1600" b="1" dirty="0">
+                <a:solidFill>
+                  <a:schemeClr val="bg1">
+                    <a:lumMod val="50000"/>
+                  </a:schemeClr>
+                </a:solidFill>
                 <a:latin typeface="Segoe UI Bold" panose="020B0802040204020203" pitchFamily="34" charset="0"/>
                 <a:cs typeface="Segoe UI Bold" panose="020B0802040204020203" pitchFamily="34" charset="0"/>
               </a:rPr>
@@ -4248,7 +4261,10 @@
           </a:lstStyle>
           <a:p>
             <a:r>
-              <a:rPr lang="en-GB" sz="2800" dirty="0">
+              <a:rPr lang="en-GB" sz="2800" b="1" dirty="0">
+                <a:solidFill>
+                  <a:schemeClr val="accent3"/>
+                </a:solidFill>
                 <a:latin typeface="Segoe UI Bold" panose="020B0802040204020203" pitchFamily="34" charset="0"/>
                 <a:cs typeface="Segoe UI Bold" panose="020B0802040204020203" pitchFamily="34" charset="0"/>
               </a:rPr>
@@ -4641,7 +4657,7 @@
         </p:nvSpPr>
         <p:spPr>
           <a:xfrm>
-            <a:off x="0" y="569057"/>
+            <a:off x="0" y="449500"/>
             <a:ext cx="2493818" cy="420770"/>
           </a:xfrm>
           <a:prstGeom prst="rect">
@@ -4821,7 +4837,12 @@
               <a:buNone/>
             </a:pPr>
             <a:r>
-              <a:rPr lang="en-GB" sz="1600" dirty="0">
+              <a:rPr lang="en-GB" sz="1600" b="1" dirty="0">
+                <a:solidFill>
+                  <a:schemeClr val="bg1">
+                    <a:lumMod val="50000"/>
+                  </a:schemeClr>
+                </a:solidFill>
                 <a:latin typeface="Segoe UI Bold" panose="020B0802040204020203" pitchFamily="34" charset="0"/>
                 <a:cs typeface="Segoe UI Bold" panose="020B0802040204020203" pitchFamily="34" charset="0"/>
               </a:rPr>
@@ -5674,7 +5695,10 @@
           </a:lstStyle>
           <a:p>
             <a:r>
-              <a:rPr lang="en-GB" sz="2800" dirty="0">
+              <a:rPr lang="en-GB" sz="2800" b="1" dirty="0">
+                <a:solidFill>
+                  <a:srgbClr val="7030A0"/>
+                </a:solidFill>
                 <a:latin typeface="Segoe UI Bold" panose="020B0802040204020203" pitchFamily="34" charset="0"/>
                 <a:cs typeface="Segoe UI Bold" panose="020B0802040204020203" pitchFamily="34" charset="0"/>
               </a:rPr>
@@ -5699,7 +5723,7 @@
         </p:nvSpPr>
         <p:spPr>
           <a:xfrm>
-            <a:off x="0" y="512649"/>
+            <a:off x="0" y="449500"/>
             <a:ext cx="5213270" cy="420770"/>
           </a:xfrm>
           <a:prstGeom prst="rect">
@@ -5879,11 +5903,16 @@
               <a:buNone/>
             </a:pPr>
             <a:r>
-              <a:rPr lang="en-GB" sz="1600" dirty="0">
+              <a:rPr lang="en-GB" sz="1600" b="1" dirty="0">
+                <a:solidFill>
+                  <a:schemeClr val="bg1">
+                    <a:lumMod val="50000"/>
+                  </a:schemeClr>
+                </a:solidFill>
                 <a:latin typeface="Segoe UI Bold" panose="020B0802040204020203" pitchFamily="34" charset="0"/>
                 <a:cs typeface="Segoe UI Bold" panose="020B0802040204020203" pitchFamily="34" charset="0"/>
               </a:rPr>
-              <a:t>Game Classification: modified Chicken Game </a:t>
+              <a:t>Modified Chicken Game </a:t>
             </a:r>
           </a:p>
         </p:txBody>
@@ -7163,6 +7192,9 @@
           <a:p>
             <a:r>
               <a:rPr lang="en-GB" sz="2800" b="1" dirty="0">
+                <a:solidFill>
+                  <a:srgbClr val="C00000"/>
+                </a:solidFill>
                 <a:latin typeface="Segoe UI Bold" panose="020B0802040204020203" pitchFamily="34" charset="0"/>
                 <a:cs typeface="Segoe UI Bold" panose="020B0802040204020203" pitchFamily="34" charset="0"/>
               </a:rPr>
@@ -7367,7 +7399,12 @@
               <a:buNone/>
             </a:pPr>
             <a:r>
-              <a:rPr lang="en-GB" sz="1600" dirty="0">
+              <a:rPr lang="en-GB" sz="1600" b="1" dirty="0">
+                <a:solidFill>
+                  <a:schemeClr val="bg1">
+                    <a:lumMod val="50000"/>
+                  </a:schemeClr>
+                </a:solidFill>
                 <a:latin typeface="Segoe UI Bold" panose="020B0802040204020203" pitchFamily="34" charset="0"/>
                 <a:cs typeface="Segoe UI Bold" panose="020B0802040204020203" pitchFamily="34" charset="0"/>
               </a:rPr>
@@ -8650,7 +8687,12 @@
           </a:lstStyle>
           <a:p>
             <a:r>
-              <a:rPr lang="en-GB" sz="3200" dirty="0">
+              <a:rPr lang="en-GB" sz="3200" b="1" i="1" dirty="0">
+                <a:solidFill>
+                  <a:schemeClr val="bg1">
+                    <a:lumMod val="50000"/>
+                  </a:schemeClr>
+                </a:solidFill>
                 <a:latin typeface="Segoe UI Bold" panose="020B0802040204020203" pitchFamily="34" charset="0"/>
                 <a:cs typeface="Segoe UI Bold" panose="020B0802040204020203" pitchFamily="34" charset="0"/>
               </a:rPr>

</xml_diff>